<commit_message>
Update PA - Segmentation Strategy.pptx
</commit_message>
<xml_diff>
--- a/website/content/PA - Segmentation Strategy.pptx
+++ b/website/content/PA - Segmentation Strategy.pptx
@@ -145,7 +145,7 @@
   <pc:docChgLst>
     <pc:chgData name="Andres Canello" userId="ad961c36-81fe-4024-995b-fb78dedd8eab" providerId="ADAL" clId="{D1C49D91-5B32-4AFE-8D93-F7D3B523A7A9}"/>
     <pc:docChg chg="undo custSel modSld">
-      <pc:chgData name="Andres Canello" userId="ad961c36-81fe-4024-995b-fb78dedd8eab" providerId="ADAL" clId="{D1C49D91-5B32-4AFE-8D93-F7D3B523A7A9}" dt="2024-07-26T01:05:26.347" v="135" actId="404"/>
+      <pc:chgData name="Andres Canello" userId="ad961c36-81fe-4024-995b-fb78dedd8eab" providerId="ADAL" clId="{D1C49D91-5B32-4AFE-8D93-F7D3B523A7A9}" dt="2024-08-12T05:55:41.137" v="233" actId="20577"/>
       <pc:docMkLst>
         <pc:docMk/>
       </pc:docMkLst>
@@ -161,6 +161,21 @@
             <pc:docMk/>
             <pc:sldMk cId="2337611797" sldId="261"/>
             <ac:spMk id="3" creationId="{F8049819-F75C-42F5-0602-8D98D91C5D2E}"/>
+          </ac:spMkLst>
+        </pc:spChg>
+      </pc:sldChg>
+      <pc:sldChg chg="modSp mod">
+        <pc:chgData name="Andres Canello" userId="ad961c36-81fe-4024-995b-fb78dedd8eab" providerId="ADAL" clId="{D1C49D91-5B32-4AFE-8D93-F7D3B523A7A9}" dt="2024-08-12T05:55:41.137" v="233" actId="20577"/>
+        <pc:sldMkLst>
+          <pc:docMk/>
+          <pc:sldMk cId="1896527647" sldId="262"/>
+        </pc:sldMkLst>
+        <pc:spChg chg="mod">
+          <ac:chgData name="Andres Canello" userId="ad961c36-81fe-4024-995b-fb78dedd8eab" providerId="ADAL" clId="{D1C49D91-5B32-4AFE-8D93-F7D3B523A7A9}" dt="2024-08-12T05:55:41.137" v="233" actId="20577"/>
+          <ac:spMkLst>
+            <pc:docMk/>
+            <pc:sldMk cId="1896527647" sldId="262"/>
+            <ac:spMk id="21" creationId="{C299DBFE-6E28-DCC6-1871-FDB600A88584}"/>
           </ac:spMkLst>
         </pc:spChg>
       </pc:sldChg>
@@ -251,7 +266,7 @@
           <a:p>
             <a:fld id="{77327C3D-098B-4D4C-A32E-DBD55BA25891}" type="datetimeFigureOut">
               <a:rPr lang="en-AU" smtClean="0"/>
-              <a:t>26/07/2024</a:t>
+              <a:t>12/08/2024</a:t>
             </a:fld>
             <a:endParaRPr lang="en-AU"/>
           </a:p>
@@ -668,7 +683,7 @@
           <a:p>
             <a:fld id="{3A3A2518-4690-49FC-85B5-49161E162655}" type="datetimeFigureOut">
               <a:rPr lang="en-AU" smtClean="0"/>
-              <a:t>26/07/2024</a:t>
+              <a:t>12/08/2024</a:t>
             </a:fld>
             <a:endParaRPr lang="en-AU"/>
           </a:p>
@@ -868,7 +883,7 @@
           <a:p>
             <a:fld id="{3A3A2518-4690-49FC-85B5-49161E162655}" type="datetimeFigureOut">
               <a:rPr lang="en-AU" smtClean="0"/>
-              <a:t>26/07/2024</a:t>
+              <a:t>12/08/2024</a:t>
             </a:fld>
             <a:endParaRPr lang="en-AU"/>
           </a:p>
@@ -1078,7 +1093,7 @@
           <a:p>
             <a:fld id="{3A3A2518-4690-49FC-85B5-49161E162655}" type="datetimeFigureOut">
               <a:rPr lang="en-AU" smtClean="0"/>
-              <a:t>26/07/2024</a:t>
+              <a:t>12/08/2024</a:t>
             </a:fld>
             <a:endParaRPr lang="en-AU"/>
           </a:p>
@@ -1278,7 +1293,7 @@
           <a:p>
             <a:fld id="{3A3A2518-4690-49FC-85B5-49161E162655}" type="datetimeFigureOut">
               <a:rPr lang="en-AU" smtClean="0"/>
-              <a:t>26/07/2024</a:t>
+              <a:t>12/08/2024</a:t>
             </a:fld>
             <a:endParaRPr lang="en-AU"/>
           </a:p>
@@ -1554,7 +1569,7 @@
           <a:p>
             <a:fld id="{3A3A2518-4690-49FC-85B5-49161E162655}" type="datetimeFigureOut">
               <a:rPr lang="en-AU" smtClean="0"/>
-              <a:t>26/07/2024</a:t>
+              <a:t>12/08/2024</a:t>
             </a:fld>
             <a:endParaRPr lang="en-AU"/>
           </a:p>
@@ -1822,7 +1837,7 @@
           <a:p>
             <a:fld id="{3A3A2518-4690-49FC-85B5-49161E162655}" type="datetimeFigureOut">
               <a:rPr lang="en-AU" smtClean="0"/>
-              <a:t>26/07/2024</a:t>
+              <a:t>12/08/2024</a:t>
             </a:fld>
             <a:endParaRPr lang="en-AU"/>
           </a:p>
@@ -2237,7 +2252,7 @@
           <a:p>
             <a:fld id="{3A3A2518-4690-49FC-85B5-49161E162655}" type="datetimeFigureOut">
               <a:rPr lang="en-AU" smtClean="0"/>
-              <a:t>26/07/2024</a:t>
+              <a:t>12/08/2024</a:t>
             </a:fld>
             <a:endParaRPr lang="en-AU"/>
           </a:p>
@@ -2379,7 +2394,7 @@
           <a:p>
             <a:fld id="{3A3A2518-4690-49FC-85B5-49161E162655}" type="datetimeFigureOut">
               <a:rPr lang="en-AU" smtClean="0"/>
-              <a:t>26/07/2024</a:t>
+              <a:t>12/08/2024</a:t>
             </a:fld>
             <a:endParaRPr lang="en-AU"/>
           </a:p>
@@ -2492,7 +2507,7 @@
           <a:p>
             <a:fld id="{3A3A2518-4690-49FC-85B5-49161E162655}" type="datetimeFigureOut">
               <a:rPr lang="en-AU" smtClean="0"/>
-              <a:t>26/07/2024</a:t>
+              <a:t>12/08/2024</a:t>
             </a:fld>
             <a:endParaRPr lang="en-AU"/>
           </a:p>
@@ -2805,7 +2820,7 @@
           <a:p>
             <a:fld id="{3A3A2518-4690-49FC-85B5-49161E162655}" type="datetimeFigureOut">
               <a:rPr lang="en-AU" smtClean="0"/>
-              <a:t>26/07/2024</a:t>
+              <a:t>12/08/2024</a:t>
             </a:fld>
             <a:endParaRPr lang="en-AU"/>
           </a:p>
@@ -3094,7 +3109,7 @@
           <a:p>
             <a:fld id="{3A3A2518-4690-49FC-85B5-49161E162655}" type="datetimeFigureOut">
               <a:rPr lang="en-AU" smtClean="0"/>
-              <a:t>26/07/2024</a:t>
+              <a:t>12/08/2024</a:t>
             </a:fld>
             <a:endParaRPr lang="en-AU"/>
           </a:p>
@@ -3337,7 +3352,7 @@
           <a:p>
             <a:fld id="{3A3A2518-4690-49FC-85B5-49161E162655}" type="datetimeFigureOut">
               <a:rPr lang="en-AU" smtClean="0"/>
-              <a:t>26/07/2024</a:t>
+              <a:t>12/08/2024</a:t>
             </a:fld>
             <a:endParaRPr lang="en-AU"/>
           </a:p>
@@ -5726,8 +5741,16 @@
               <a:buNone/>
             </a:pPr>
             <a:r>
+              <a:rPr lang="en-AU" sz="2000" dirty="0"/>
+              <a:t>On VPN replacement scenarios or when granular app segments are unknown, start with Quick Access to provide access </a:t>
+            </a:r>
+            <a:r>
               <a:rPr lang="en-AU" sz="2000"/>
-              <a:t>Always start with Quick Access to provide access to wide ranges of IPs and ports.</a:t>
+              <a:t>to a </a:t>
+            </a:r>
+            <a:r>
+              <a:rPr lang="en-AU" sz="2000" dirty="0"/>
+              <a:t>ranges of IPs and ports.</a:t>
             </a:r>
           </a:p>
           <a:p>
@@ -5735,7 +5758,7 @@
               <a:buNone/>
             </a:pPr>
             <a:r>
-              <a:rPr lang="en-AU" sz="2000"/>
+              <a:rPr lang="en-AU" sz="2000" dirty="0"/>
               <a:t>For example, you might want to start with the following app segment matching the access currently provided by your VPN:</a:t>
             </a:r>
           </a:p>
@@ -5744,7 +5767,7 @@
               <a:buNone/>
             </a:pPr>
             <a:r>
-              <a:rPr lang="en-AU" sz="2000" b="1"/>
+              <a:rPr lang="en-AU" sz="2000" b="1" dirty="0"/>
               <a:t>10.1.1.0/16 1-52,54-65535 TCP,UDP</a:t>
             </a:r>
           </a:p>
@@ -5752,14 +5775,14 @@
             <a:pPr marL="0" indent="0">
               <a:buNone/>
             </a:pPr>
-            <a:endParaRPr lang="en-AU" sz="2000"/>
+            <a:endParaRPr lang="en-AU" sz="2000" dirty="0"/>
           </a:p>
           <a:p>
             <a:pPr marL="0" indent="0">
               <a:buNone/>
             </a:pPr>
             <a:r>
-              <a:rPr lang="en-AU" sz="2000"/>
+              <a:rPr lang="en-AU" sz="2000" dirty="0"/>
               <a:t>As you identify app segments that should only be accessed by specific users, create Enterprise Apps that define those segments.</a:t>
             </a:r>
           </a:p>

</xml_diff>